<commit_message>
esto es para lam version3
</commit_message>
<xml_diff>
--- a/tarea.pptx
+++ b/tarea.pptx
@@ -7,6 +7,7 @@
   <p:sldIdLst>
     <p:sldId id="256" r:id="rId2"/>
     <p:sldId id="257" r:id="rId3"/>
+    <p:sldId id="258" r:id="rId4"/>
   </p:sldIdLst>
   <p:sldSz cx="12192000" cy="6858000"/>
   <p:notesSz cx="6858000" cy="9144000"/>
@@ -6035,6 +6036,96 @@
 </p:sld>
 </file>
 
+<file path=ppt/slides/slide3.xml><?xml version="1.0" encoding="utf-8"?>
+<p:sld xmlns:a="http://schemas.openxmlformats.org/drawingml/2006/main" xmlns:r="http://schemas.openxmlformats.org/officeDocument/2006/relationships" xmlns:p="http://schemas.openxmlformats.org/presentationml/2006/main">
+  <p:cSld>
+    <p:spTree>
+      <p:nvGrpSpPr>
+        <p:cNvPr id="1" name=""/>
+        <p:cNvGrpSpPr/>
+        <p:nvPr/>
+      </p:nvGrpSpPr>
+      <p:grpSpPr>
+        <a:xfrm>
+          <a:off x="0" y="0"/>
+          <a:ext cx="0" cy="0"/>
+          <a:chOff x="0" y="0"/>
+          <a:chExt cx="0" cy="0"/>
+        </a:xfrm>
+      </p:grpSpPr>
+      <p:sp>
+        <p:nvSpPr>
+          <p:cNvPr id="3" name="Marcador de contenido 2"/>
+          <p:cNvSpPr>
+            <a:spLocks noGrp="1"/>
+          </p:cNvSpPr>
+          <p:nvPr>
+            <p:ph idx="1"/>
+          </p:nvPr>
+        </p:nvSpPr>
+        <p:spPr>
+          <a:xfrm>
+            <a:off x="1085107" y="1382113"/>
+            <a:ext cx="8596668" cy="3880773"/>
+          </a:xfrm>
+        </p:spPr>
+        <p:txBody>
+          <a:bodyPr>
+            <a:noAutofit/>
+          </a:bodyPr>
+          <a:lstStyle/>
+          <a:p>
+            <a:pPr lvl="0" algn="ctr"/>
+            <a:r>
+              <a:rPr lang="es-ES" sz="4000" dirty="0"/>
+              <a:t>GIT COMMIT</a:t>
+            </a:r>
+          </a:p>
+          <a:p>
+            <a:r>
+              <a:rPr lang="es-ES" sz="4000" dirty="0"/>
+              <a:t>este comando se usa para cambiar la cabecera.</a:t>
+            </a:r>
+          </a:p>
+          <a:p>
+            <a:r>
+              <a:rPr lang="es-ES" sz="4000" dirty="0"/>
+              <a:t>Ejemplo:</a:t>
+            </a:r>
+          </a:p>
+          <a:p>
+            <a:r>
+              <a:rPr lang="es-ES" sz="4000" dirty="0" err="1"/>
+              <a:t>Git</a:t>
+            </a:r>
+            <a:r>
+              <a:rPr lang="es-ES" sz="4000" dirty="0"/>
+              <a:t> </a:t>
+            </a:r>
+            <a:r>
+              <a:rPr lang="es-ES" sz="4000" dirty="0" err="1"/>
+              <a:t>commit</a:t>
+            </a:r>
+            <a:r>
+              <a:rPr lang="es-ES" sz="4000" dirty="0"/>
+              <a:t> –m “es un mensaje de prueba”</a:t>
+            </a:r>
+          </a:p>
+        </p:txBody>
+      </p:sp>
+    </p:spTree>
+    <p:extLst>
+      <p:ext uri="{BB962C8B-B14F-4D97-AF65-F5344CB8AC3E}">
+        <p14:creationId xmlns:p14="http://schemas.microsoft.com/office/powerpoint/2010/main" val="2919408995"/>
+      </p:ext>
+    </p:extLst>
+  </p:cSld>
+  <p:clrMapOvr>
+    <a:masterClrMapping/>
+  </p:clrMapOvr>
+</p:sld>
+</file>
+
 <file path=ppt/theme/theme1.xml><?xml version="1.0" encoding="utf-8"?>
 <a:theme xmlns:a="http://schemas.openxmlformats.org/drawingml/2006/main" name="Faceta">
   <a:themeElements>

</xml_diff>

<commit_message>
esto es para la version4
</commit_message>
<xml_diff>
--- a/tarea.pptx
+++ b/tarea.pptx
@@ -8,6 +8,7 @@
     <p:sldId id="256" r:id="rId2"/>
     <p:sldId id="257" r:id="rId3"/>
     <p:sldId id="258" r:id="rId4"/>
+    <p:sldId id="259" r:id="rId5"/>
   </p:sldIdLst>
   <p:sldSz cx="12192000" cy="6858000"/>
   <p:notesSz cx="6858000" cy="9144000"/>
@@ -6077,8 +6078,12 @@
           <a:p>
             <a:pPr lvl="0" algn="ctr"/>
             <a:r>
+              <a:rPr lang="es-ES" sz="4000" dirty="0" smtClean="0"/>
+              <a:t>3. GIT </a:t>
+            </a:r>
+            <a:r>
               <a:rPr lang="es-ES" sz="4000" dirty="0"/>
-              <a:t>GIT COMMIT</a:t>
+              <a:t>COMMIT</a:t>
             </a:r>
           </a:p>
           <a:p>
@@ -6117,6 +6122,95 @@
     <p:extLst>
       <p:ext uri="{BB962C8B-B14F-4D97-AF65-F5344CB8AC3E}">
         <p14:creationId xmlns:p14="http://schemas.microsoft.com/office/powerpoint/2010/main" val="2919408995"/>
+      </p:ext>
+    </p:extLst>
+  </p:cSld>
+  <p:clrMapOvr>
+    <a:masterClrMapping/>
+  </p:clrMapOvr>
+</p:sld>
+</file>
+
+<file path=ppt/slides/slide4.xml><?xml version="1.0" encoding="utf-8"?>
+<p:sld xmlns:a="http://schemas.openxmlformats.org/drawingml/2006/main" xmlns:r="http://schemas.openxmlformats.org/officeDocument/2006/relationships" xmlns:p="http://schemas.openxmlformats.org/presentationml/2006/main">
+  <p:cSld>
+    <p:spTree>
+      <p:nvGrpSpPr>
+        <p:cNvPr id="1" name=""/>
+        <p:cNvGrpSpPr/>
+        <p:nvPr/>
+      </p:nvGrpSpPr>
+      <p:grpSpPr>
+        <a:xfrm>
+          <a:off x="0" y="0"/>
+          <a:ext cx="0" cy="0"/>
+          <a:chOff x="0" y="0"/>
+          <a:chExt cx="0" cy="0"/>
+        </a:xfrm>
+      </p:grpSpPr>
+      <p:sp>
+        <p:nvSpPr>
+          <p:cNvPr id="3" name="Marcador de contenido 2"/>
+          <p:cNvSpPr>
+            <a:spLocks noGrp="1"/>
+          </p:cNvSpPr>
+          <p:nvPr>
+            <p:ph idx="1"/>
+          </p:nvPr>
+        </p:nvSpPr>
+        <p:spPr>
+          <a:xfrm>
+            <a:off x="1455810" y="1369757"/>
+            <a:ext cx="8596668" cy="3880773"/>
+          </a:xfrm>
+        </p:spPr>
+        <p:txBody>
+          <a:bodyPr>
+            <a:normAutofit/>
+          </a:bodyPr>
+          <a:lstStyle/>
+          <a:p>
+            <a:pPr lvl="0" algn="ctr"/>
+            <a:r>
+              <a:rPr lang="es-ES" sz="3600" dirty="0" smtClean="0"/>
+              <a:t>4. GIT </a:t>
+            </a:r>
+            <a:r>
+              <a:rPr lang="es-ES" sz="3600" dirty="0"/>
+              <a:t>STATUS</a:t>
+            </a:r>
+          </a:p>
+          <a:p>
+            <a:r>
+              <a:rPr lang="es-ES" sz="3600" dirty="0"/>
+              <a:t>Este comando sirve para saber la lista de los archivos que se han cambiado a lo largo de un tiempo.</a:t>
+            </a:r>
+          </a:p>
+          <a:p>
+            <a:r>
+              <a:rPr lang="es-ES" sz="3600" dirty="0"/>
+              <a:t>Ejemplo :</a:t>
+            </a:r>
+          </a:p>
+          <a:p>
+            <a:r>
+              <a:rPr lang="es-ES" sz="3600" dirty="0" err="1"/>
+              <a:t>Git</a:t>
+            </a:r>
+            <a:r>
+              <a:rPr lang="es-ES" sz="3600" dirty="0"/>
+              <a:t> status</a:t>
+            </a:r>
+          </a:p>
+          <a:p>
+            <a:endParaRPr lang="es-ES" sz="3600" dirty="0"/>
+          </a:p>
+        </p:txBody>
+      </p:sp>
+    </p:spTree>
+    <p:extLst>
+      <p:ext uri="{BB962C8B-B14F-4D97-AF65-F5344CB8AC3E}">
+        <p14:creationId xmlns:p14="http://schemas.microsoft.com/office/powerpoint/2010/main" val="1828916664"/>
       </p:ext>
     </p:extLst>
   </p:cSld>

</xml_diff>

<commit_message>
esto es para lam version5
</commit_message>
<xml_diff>
--- a/tarea.pptx
+++ b/tarea.pptx
@@ -5,10 +5,12 @@
     <p:sldMasterId id="2147483694" r:id="rId1"/>
   </p:sldMasterIdLst>
   <p:sldIdLst>
-    <p:sldId id="256" r:id="rId2"/>
-    <p:sldId id="257" r:id="rId3"/>
-    <p:sldId id="258" r:id="rId4"/>
-    <p:sldId id="259" r:id="rId5"/>
+    <p:sldId id="261" r:id="rId2"/>
+    <p:sldId id="256" r:id="rId3"/>
+    <p:sldId id="257" r:id="rId4"/>
+    <p:sldId id="258" r:id="rId5"/>
+    <p:sldId id="259" r:id="rId6"/>
+    <p:sldId id="260" r:id="rId7"/>
   </p:sldIdLst>
   <p:sldSz cx="12192000" cy="6858000"/>
   <p:notesSz cx="6858000" cy="9144000"/>
@@ -5818,103 +5820,88 @@
       </p:grpSpPr>
       <p:sp>
         <p:nvSpPr>
-          <p:cNvPr id="4" name="CuadroTexto 3"/>
-          <p:cNvSpPr txBox="1"/>
-          <p:nvPr/>
-        </p:nvSpPr>
-        <p:spPr>
-          <a:xfrm>
-            <a:off x="1638300" y="495300"/>
-            <a:ext cx="9296400" cy="5878532"/>
-          </a:xfrm>
-          <a:prstGeom prst="rect">
-            <a:avLst/>
-          </a:prstGeom>
-          <a:noFill/>
-        </p:spPr>
-        <p:txBody>
-          <a:bodyPr wrap="square" rtlCol="0">
-            <a:spAutoFit/>
-          </a:bodyPr>
-          <a:lstStyle/>
-          <a:p>
-            <a:pPr algn="ctr"/>
-            <a:r>
-              <a:rPr lang="es-ES" sz="4400" b="1" dirty="0" smtClean="0"/>
-              <a:t>Sentencias de </a:t>
-            </a:r>
-            <a:r>
-              <a:rPr lang="es-ES" sz="4400" b="1" dirty="0" err="1" smtClean="0"/>
-              <a:t>git</a:t>
-            </a:r>
-            <a:endParaRPr lang="es-ES" sz="4400" b="1" dirty="0" smtClean="0"/>
-          </a:p>
-          <a:p>
-            <a:pPr algn="ctr"/>
-            <a:endParaRPr lang="es-ES" sz="4400" b="1" dirty="0"/>
-          </a:p>
-          <a:p>
-            <a:pPr lvl="0" algn="just"/>
-            <a:r>
-              <a:rPr lang="es-ES" sz="3600" b="1" dirty="0" smtClean="0"/>
-              <a:t>1. GIT </a:t>
-            </a:r>
-            <a:r>
-              <a:rPr lang="es-ES" sz="3600" b="1" dirty="0"/>
-              <a:t>CONFIG</a:t>
-            </a:r>
-          </a:p>
-          <a:p>
-            <a:pPr algn="just"/>
-            <a:r>
-              <a:rPr lang="es-ES" sz="3600" dirty="0"/>
-              <a:t>Este comando se usa para para establecer una configuración especifica de usuario como por ejemplo el caso del Email.</a:t>
-            </a:r>
-          </a:p>
-          <a:p>
-            <a:pPr algn="just"/>
-            <a:r>
-              <a:rPr lang="es-ES" sz="3600" u="sng" dirty="0"/>
-              <a:t>Ejemplo:</a:t>
-            </a:r>
-          </a:p>
-          <a:p>
-            <a:r>
-              <a:rPr lang="en-US" sz="3600" dirty="0" err="1"/>
-              <a:t>Git</a:t>
-            </a:r>
-            <a:r>
-              <a:rPr lang="en-US" sz="3600" dirty="0"/>
-              <a:t> </a:t>
-            </a:r>
-            <a:r>
-              <a:rPr lang="en-US" sz="3600" dirty="0" err="1"/>
-              <a:t>config</a:t>
-            </a:r>
-            <a:r>
-              <a:rPr lang="en-US" sz="3600" dirty="0"/>
-              <a:t> –global </a:t>
-            </a:r>
-            <a:r>
-              <a:rPr lang="en-US" sz="3600" dirty="0" err="1"/>
-              <a:t>user.email</a:t>
-            </a:r>
-            <a:r>
-              <a:rPr lang="en-US" sz="3600" dirty="0"/>
-              <a:t> wocinco@gmail.com</a:t>
-            </a:r>
-            <a:endParaRPr lang="es-ES" sz="3600" dirty="0"/>
-          </a:p>
-          <a:p>
-            <a:pPr algn="just"/>
-            <a:endParaRPr lang="es-ES" sz="3600" dirty="0"/>
+          <p:cNvPr id="2" name="Título 1"/>
+          <p:cNvSpPr>
+            <a:spLocks noGrp="1"/>
+          </p:cNvSpPr>
+          <p:nvPr>
+            <p:ph type="title"/>
+          </p:nvPr>
+        </p:nvSpPr>
+        <p:spPr/>
+        <p:txBody>
+          <a:bodyPr/>
+          <a:lstStyle/>
+          <a:p>
+            <a:r>
+              <a:rPr lang="es-ES" dirty="0" smtClean="0"/>
+              <a:t>UMG</a:t>
+            </a:r>
+            <a:br>
+              <a:rPr lang="es-ES" dirty="0" smtClean="0"/>
+            </a:br>
+            <a:r>
+              <a:rPr lang="es-ES" dirty="0" smtClean="0"/>
+              <a:t>ANALISIS 2</a:t>
+            </a:r>
+            <a:endParaRPr lang="es-ES" dirty="0"/>
+          </a:p>
+        </p:txBody>
+      </p:sp>
+      <p:sp>
+        <p:nvSpPr>
+          <p:cNvPr id="3" name="Marcador de contenido 2"/>
+          <p:cNvSpPr>
+            <a:spLocks noGrp="1"/>
+          </p:cNvSpPr>
+          <p:nvPr>
+            <p:ph idx="1"/>
+          </p:nvPr>
+        </p:nvSpPr>
+        <p:spPr/>
+        <p:txBody>
+          <a:bodyPr/>
+          <a:lstStyle/>
+          <a:p>
+            <a:r>
+              <a:rPr lang="es-ES" dirty="0" smtClean="0"/>
+              <a:t>PRUEBA DE VERSIONAMIENTO</a:t>
+            </a:r>
+          </a:p>
+          <a:p>
+            <a:endParaRPr lang="es-ES" dirty="0"/>
+          </a:p>
+          <a:p>
+            <a:endParaRPr lang="es-ES" dirty="0" smtClean="0"/>
+          </a:p>
+          <a:p>
+            <a:endParaRPr lang="es-ES" dirty="0"/>
+          </a:p>
+          <a:p>
+            <a:endParaRPr lang="es-ES" dirty="0" smtClean="0"/>
+          </a:p>
+          <a:p>
+            <a:endParaRPr lang="es-ES" dirty="0"/>
+          </a:p>
+          <a:p>
+            <a:r>
+              <a:rPr lang="es-ES" dirty="0" smtClean="0"/>
+              <a:t>MARCO TULIO WOCINCO</a:t>
+            </a:r>
+          </a:p>
+          <a:p>
+            <a:r>
+              <a:rPr lang="es-ES" smtClean="0"/>
+              <a:t>0907-15-7071</a:t>
+            </a:r>
+            <a:endParaRPr lang="es-ES" dirty="0"/>
           </a:p>
         </p:txBody>
       </p:sp>
     </p:spTree>
     <p:extLst>
       <p:ext uri="{BB962C8B-B14F-4D97-AF65-F5344CB8AC3E}">
-        <p14:creationId xmlns:p14="http://schemas.microsoft.com/office/powerpoint/2010/main" val="1122091495"/>
+        <p14:creationId xmlns:p14="http://schemas.microsoft.com/office/powerpoint/2010/main" val="945240070"/>
       </p:ext>
     </p:extLst>
   </p:cSld>
@@ -5949,8 +5936,8 @@
         </p:nvSpPr>
         <p:spPr>
           <a:xfrm>
-            <a:off x="1841157" y="864974"/>
-            <a:ext cx="8328454" cy="4524315"/>
+            <a:off x="1638300" y="495300"/>
+            <a:ext cx="9296400" cy="5878532"/>
           </a:xfrm>
           <a:prstGeom prst="rect">
             <a:avLst/>
@@ -5963,63 +5950,75 @@
           </a:bodyPr>
           <a:lstStyle/>
           <a:p>
-            <a:pPr lvl="0" algn="ctr"/>
-            <a:r>
-              <a:rPr lang="es-ES" sz="3600" dirty="0" smtClean="0"/>
-              <a:t>2. GIT </a:t>
-            </a:r>
+            <a:pPr algn="ctr"/>
+            <a:r>
+              <a:rPr lang="es-ES" sz="4400" b="1" dirty="0" smtClean="0"/>
+              <a:t>Sentencias de </a:t>
+            </a:r>
+            <a:r>
+              <a:rPr lang="es-ES" sz="4400" b="1" dirty="0" err="1" smtClean="0"/>
+              <a:t>git</a:t>
+            </a:r>
+            <a:endParaRPr lang="es-ES" sz="4400" b="1" dirty="0" smtClean="0"/>
+          </a:p>
+          <a:p>
+            <a:pPr algn="ctr"/>
+            <a:endParaRPr lang="es-ES" sz="4400" b="1" dirty="0"/>
+          </a:p>
+          <a:p>
+            <a:pPr lvl="0" algn="just"/>
+            <a:r>
+              <a:rPr lang="es-ES" sz="3600" b="1" dirty="0" smtClean="0"/>
+              <a:t>1. GIT </a:t>
+            </a:r>
+            <a:r>
+              <a:rPr lang="es-ES" sz="3600" b="1" dirty="0"/>
+              <a:t>CONFIG</a:t>
+            </a:r>
+          </a:p>
+          <a:p>
+            <a:pPr algn="just"/>
             <a:r>
               <a:rPr lang="es-ES" sz="3600" dirty="0"/>
-              <a:t>ADD</a:t>
-            </a:r>
-          </a:p>
-          <a:p>
-            <a:r>
-              <a:rPr lang="es-ES" sz="3600" dirty="0"/>
-              <a:t>Este comando puede ser usado para </a:t>
-            </a:r>
-            <a:r>
-              <a:rPr lang="es-ES" sz="3600" dirty="0" err="1"/>
-              <a:t>agrefar</a:t>
-            </a:r>
-            <a:r>
-              <a:rPr lang="es-ES" sz="3600" dirty="0"/>
-              <a:t> archivos al </a:t>
-            </a:r>
-            <a:r>
-              <a:rPr lang="es-ES" sz="3600" dirty="0" err="1"/>
-              <a:t>index</a:t>
-            </a:r>
-            <a:r>
-              <a:rPr lang="es-ES" sz="3600" dirty="0"/>
-              <a:t> como por ejemplo el archivo que se uso la vez pasada prueba.txt</a:t>
-            </a:r>
-          </a:p>
-          <a:p>
-            <a:r>
-              <a:rPr lang="es-ES" sz="3600" dirty="0"/>
+              <a:t>Este comando se usa para para establecer una configuración especifica de usuario como por ejemplo el caso del Email.</a:t>
+            </a:r>
+          </a:p>
+          <a:p>
+            <a:pPr algn="just"/>
+            <a:r>
+              <a:rPr lang="es-ES" sz="3600" u="sng" dirty="0"/>
               <a:t>Ejemplo:</a:t>
             </a:r>
           </a:p>
           <a:p>
             <a:r>
-              <a:rPr lang="es-ES" sz="3600" dirty="0" err="1"/>
+              <a:rPr lang="en-US" sz="3600" dirty="0" err="1"/>
               <a:t>Git</a:t>
             </a:r>
             <a:r>
-              <a:rPr lang="es-ES" sz="3600" dirty="0"/>
+              <a:rPr lang="en-US" sz="3600" dirty="0"/>
               <a:t> </a:t>
             </a:r>
             <a:r>
-              <a:rPr lang="es-ES" sz="3600" dirty="0" err="1"/>
-              <a:t>add</a:t>
-            </a:r>
-            <a:r>
-              <a:rPr lang="es-ES" sz="3600" dirty="0"/>
-              <a:t> prueba.txt</a:t>
-            </a:r>
-          </a:p>
-          <a:p>
+              <a:rPr lang="en-US" sz="3600" dirty="0" err="1"/>
+              <a:t>config</a:t>
+            </a:r>
+            <a:r>
+              <a:rPr lang="en-US" sz="3600" dirty="0"/>
+              <a:t> –global </a:t>
+            </a:r>
+            <a:r>
+              <a:rPr lang="en-US" sz="3600" dirty="0" err="1"/>
+              <a:t>user.email</a:t>
+            </a:r>
+            <a:r>
+              <a:rPr lang="en-US" sz="3600" dirty="0"/>
+              <a:t> wocinco@gmail.com</a:t>
+            </a:r>
+            <a:endParaRPr lang="es-ES" sz="3600" dirty="0"/>
+          </a:p>
+          <a:p>
+            <a:pPr algn="just"/>
             <a:endParaRPr lang="es-ES" sz="3600" dirty="0"/>
           </a:p>
         </p:txBody>
@@ -6027,7 +6026,7 @@
     </p:spTree>
     <p:extLst>
       <p:ext uri="{BB962C8B-B14F-4D97-AF65-F5344CB8AC3E}">
-        <p14:creationId xmlns:p14="http://schemas.microsoft.com/office/powerpoint/2010/main" val="2817897979"/>
+        <p14:creationId xmlns:p14="http://schemas.microsoft.com/office/powerpoint/2010/main" val="1122091495"/>
       </p:ext>
     </p:extLst>
   </p:cSld>
@@ -6056,72 +6055,91 @@
       </p:grpSpPr>
       <p:sp>
         <p:nvSpPr>
-          <p:cNvPr id="3" name="Marcador de contenido 2"/>
-          <p:cNvSpPr>
-            <a:spLocks noGrp="1"/>
-          </p:cNvSpPr>
-          <p:nvPr>
-            <p:ph idx="1"/>
-          </p:nvPr>
+          <p:cNvPr id="4" name="CuadroTexto 3"/>
+          <p:cNvSpPr txBox="1"/>
+          <p:nvPr/>
         </p:nvSpPr>
         <p:spPr>
           <a:xfrm>
-            <a:off x="1085107" y="1382113"/>
-            <a:ext cx="8596668" cy="3880773"/>
+            <a:off x="1841157" y="864974"/>
+            <a:ext cx="8328454" cy="4524315"/>
           </a:xfrm>
+          <a:prstGeom prst="rect">
+            <a:avLst/>
+          </a:prstGeom>
+          <a:noFill/>
         </p:spPr>
         <p:txBody>
-          <a:bodyPr>
-            <a:noAutofit/>
+          <a:bodyPr wrap="square" rtlCol="0">
+            <a:spAutoFit/>
           </a:bodyPr>
           <a:lstStyle/>
           <a:p>
             <a:pPr lvl="0" algn="ctr"/>
             <a:r>
-              <a:rPr lang="es-ES" sz="4000" dirty="0" smtClean="0"/>
-              <a:t>3. GIT </a:t>
-            </a:r>
-            <a:r>
-              <a:rPr lang="es-ES" sz="4000" dirty="0"/>
-              <a:t>COMMIT</a:t>
-            </a:r>
-          </a:p>
-          <a:p>
-            <a:r>
-              <a:rPr lang="es-ES" sz="4000" dirty="0"/>
-              <a:t>este comando se usa para cambiar la cabecera.</a:t>
-            </a:r>
-          </a:p>
-          <a:p>
-            <a:r>
-              <a:rPr lang="es-ES" sz="4000" dirty="0"/>
+              <a:rPr lang="es-ES" sz="3600" dirty="0" smtClean="0"/>
+              <a:t>2. GIT </a:t>
+            </a:r>
+            <a:r>
+              <a:rPr lang="es-ES" sz="3600" dirty="0"/>
+              <a:t>ADD</a:t>
+            </a:r>
+          </a:p>
+          <a:p>
+            <a:r>
+              <a:rPr lang="es-ES" sz="3600" dirty="0"/>
+              <a:t>Este comando puede ser usado para </a:t>
+            </a:r>
+            <a:r>
+              <a:rPr lang="es-ES" sz="3600" dirty="0" err="1"/>
+              <a:t>agrefar</a:t>
+            </a:r>
+            <a:r>
+              <a:rPr lang="es-ES" sz="3600" dirty="0"/>
+              <a:t> archivos al </a:t>
+            </a:r>
+            <a:r>
+              <a:rPr lang="es-ES" sz="3600" dirty="0" err="1"/>
+              <a:t>index</a:t>
+            </a:r>
+            <a:r>
+              <a:rPr lang="es-ES" sz="3600" dirty="0"/>
+              <a:t> como por ejemplo el archivo que se uso la vez pasada prueba.txt</a:t>
+            </a:r>
+          </a:p>
+          <a:p>
+            <a:r>
+              <a:rPr lang="es-ES" sz="3600" dirty="0"/>
               <a:t>Ejemplo:</a:t>
             </a:r>
           </a:p>
           <a:p>
             <a:r>
-              <a:rPr lang="es-ES" sz="4000" dirty="0" err="1"/>
+              <a:rPr lang="es-ES" sz="3600" dirty="0" err="1"/>
               <a:t>Git</a:t>
             </a:r>
             <a:r>
-              <a:rPr lang="es-ES" sz="4000" dirty="0"/>
+              <a:rPr lang="es-ES" sz="3600" dirty="0"/>
               <a:t> </a:t>
             </a:r>
             <a:r>
-              <a:rPr lang="es-ES" sz="4000" dirty="0" err="1"/>
-              <a:t>commit</a:t>
-            </a:r>
-            <a:r>
-              <a:rPr lang="es-ES" sz="4000" dirty="0"/>
-              <a:t> –m “es un mensaje de prueba”</a:t>
-            </a:r>
+              <a:rPr lang="es-ES" sz="3600" dirty="0" err="1"/>
+              <a:t>add</a:t>
+            </a:r>
+            <a:r>
+              <a:rPr lang="es-ES" sz="3600" dirty="0"/>
+              <a:t> prueba.txt</a:t>
+            </a:r>
+          </a:p>
+          <a:p>
+            <a:endParaRPr lang="es-ES" sz="3600" dirty="0"/>
           </a:p>
         </p:txBody>
       </p:sp>
     </p:spTree>
     <p:extLst>
       <p:ext uri="{BB962C8B-B14F-4D97-AF65-F5344CB8AC3E}">
-        <p14:creationId xmlns:p14="http://schemas.microsoft.com/office/powerpoint/2010/main" val="2919408995"/>
+        <p14:creationId xmlns:p14="http://schemas.microsoft.com/office/powerpoint/2010/main" val="2817897979"/>
       </p:ext>
     </p:extLst>
   </p:cSld>
@@ -6160,6 +6178,100 @@
         </p:nvSpPr>
         <p:spPr>
           <a:xfrm>
+            <a:off x="1085107" y="1382113"/>
+            <a:ext cx="8596668" cy="3880773"/>
+          </a:xfrm>
+        </p:spPr>
+        <p:txBody>
+          <a:bodyPr>
+            <a:noAutofit/>
+          </a:bodyPr>
+          <a:lstStyle/>
+          <a:p>
+            <a:pPr lvl="0" algn="ctr"/>
+            <a:r>
+              <a:rPr lang="es-ES" sz="4000" dirty="0" smtClean="0"/>
+              <a:t>3. GIT </a:t>
+            </a:r>
+            <a:r>
+              <a:rPr lang="es-ES" sz="4000" dirty="0"/>
+              <a:t>COMMIT</a:t>
+            </a:r>
+          </a:p>
+          <a:p>
+            <a:r>
+              <a:rPr lang="es-ES" sz="4000" dirty="0"/>
+              <a:t>este comando se usa para cambiar la cabecera.</a:t>
+            </a:r>
+          </a:p>
+          <a:p>
+            <a:r>
+              <a:rPr lang="es-ES" sz="4000" dirty="0"/>
+              <a:t>Ejemplo:</a:t>
+            </a:r>
+          </a:p>
+          <a:p>
+            <a:r>
+              <a:rPr lang="es-ES" sz="4000" dirty="0" err="1"/>
+              <a:t>Git</a:t>
+            </a:r>
+            <a:r>
+              <a:rPr lang="es-ES" sz="4000" dirty="0"/>
+              <a:t> </a:t>
+            </a:r>
+            <a:r>
+              <a:rPr lang="es-ES" sz="4000" dirty="0" err="1"/>
+              <a:t>commit</a:t>
+            </a:r>
+            <a:r>
+              <a:rPr lang="es-ES" sz="4000" dirty="0"/>
+              <a:t> –m “es un mensaje de prueba”</a:t>
+            </a:r>
+          </a:p>
+        </p:txBody>
+      </p:sp>
+    </p:spTree>
+    <p:extLst>
+      <p:ext uri="{BB962C8B-B14F-4D97-AF65-F5344CB8AC3E}">
+        <p14:creationId xmlns:p14="http://schemas.microsoft.com/office/powerpoint/2010/main" val="2919408995"/>
+      </p:ext>
+    </p:extLst>
+  </p:cSld>
+  <p:clrMapOvr>
+    <a:masterClrMapping/>
+  </p:clrMapOvr>
+</p:sld>
+</file>
+
+<file path=ppt/slides/slide5.xml><?xml version="1.0" encoding="utf-8"?>
+<p:sld xmlns:a="http://schemas.openxmlformats.org/drawingml/2006/main" xmlns:r="http://schemas.openxmlformats.org/officeDocument/2006/relationships" xmlns:p="http://schemas.openxmlformats.org/presentationml/2006/main">
+  <p:cSld>
+    <p:spTree>
+      <p:nvGrpSpPr>
+        <p:cNvPr id="1" name=""/>
+        <p:cNvGrpSpPr/>
+        <p:nvPr/>
+      </p:nvGrpSpPr>
+      <p:grpSpPr>
+        <a:xfrm>
+          <a:off x="0" y="0"/>
+          <a:ext cx="0" cy="0"/>
+          <a:chOff x="0" y="0"/>
+          <a:chExt cx="0" cy="0"/>
+        </a:xfrm>
+      </p:grpSpPr>
+      <p:sp>
+        <p:nvSpPr>
+          <p:cNvPr id="3" name="Marcador de contenido 2"/>
+          <p:cNvSpPr>
+            <a:spLocks noGrp="1"/>
+          </p:cNvSpPr>
+          <p:nvPr>
+            <p:ph idx="1"/>
+          </p:nvPr>
+        </p:nvSpPr>
+        <p:spPr>
+          <a:xfrm>
             <a:off x="1455810" y="1369757"/>
             <a:ext cx="8596668" cy="3880773"/>
           </a:xfrm>
@@ -6211,6 +6323,105 @@
     <p:extLst>
       <p:ext uri="{BB962C8B-B14F-4D97-AF65-F5344CB8AC3E}">
         <p14:creationId xmlns:p14="http://schemas.microsoft.com/office/powerpoint/2010/main" val="1828916664"/>
+      </p:ext>
+    </p:extLst>
+  </p:cSld>
+  <p:clrMapOvr>
+    <a:masterClrMapping/>
+  </p:clrMapOvr>
+</p:sld>
+</file>
+
+<file path=ppt/slides/slide6.xml><?xml version="1.0" encoding="utf-8"?>
+<p:sld xmlns:a="http://schemas.openxmlformats.org/drawingml/2006/main" xmlns:r="http://schemas.openxmlformats.org/officeDocument/2006/relationships" xmlns:p="http://schemas.openxmlformats.org/presentationml/2006/main">
+  <p:cSld>
+    <p:spTree>
+      <p:nvGrpSpPr>
+        <p:cNvPr id="1" name=""/>
+        <p:cNvGrpSpPr/>
+        <p:nvPr/>
+      </p:nvGrpSpPr>
+      <p:grpSpPr>
+        <a:xfrm>
+          <a:off x="0" y="0"/>
+          <a:ext cx="0" cy="0"/>
+          <a:chOff x="0" y="0"/>
+          <a:chExt cx="0" cy="0"/>
+        </a:xfrm>
+      </p:grpSpPr>
+      <p:sp>
+        <p:nvSpPr>
+          <p:cNvPr id="3" name="Marcador de contenido 2"/>
+          <p:cNvSpPr>
+            <a:spLocks noGrp="1"/>
+          </p:cNvSpPr>
+          <p:nvPr>
+            <p:ph idx="1"/>
+          </p:nvPr>
+        </p:nvSpPr>
+        <p:spPr>
+          <a:xfrm>
+            <a:off x="1344599" y="1394471"/>
+            <a:ext cx="8596668" cy="3880773"/>
+          </a:xfrm>
+        </p:spPr>
+        <p:txBody>
+          <a:bodyPr>
+            <a:noAutofit/>
+          </a:bodyPr>
+          <a:lstStyle/>
+          <a:p>
+            <a:pPr lvl="0" algn="ctr"/>
+            <a:r>
+              <a:rPr lang="es-ES" sz="4000" dirty="0" smtClean="0"/>
+              <a:t>5. GIT </a:t>
+            </a:r>
+            <a:r>
+              <a:rPr lang="es-ES" sz="4000" dirty="0"/>
+              <a:t>CHECKOUT</a:t>
+            </a:r>
+          </a:p>
+          <a:p>
+            <a:r>
+              <a:rPr lang="es-ES" sz="4000" dirty="0"/>
+              <a:t>Este comando se puede usar para crear ramas o cambiar entre ellas.</a:t>
+            </a:r>
+          </a:p>
+          <a:p>
+            <a:r>
+              <a:rPr lang="en-US" sz="4000" dirty="0" err="1"/>
+              <a:t>Ejemplo</a:t>
+            </a:r>
+            <a:r>
+              <a:rPr lang="en-US" sz="4000" dirty="0"/>
+              <a:t>:</a:t>
+            </a:r>
+            <a:endParaRPr lang="es-ES" sz="4000" dirty="0"/>
+          </a:p>
+          <a:p>
+            <a:r>
+              <a:rPr lang="en-US" sz="4000" dirty="0"/>
+              <a:t>Command </a:t>
+            </a:r>
+            <a:r>
+              <a:rPr lang="en-US" sz="4000" dirty="0" err="1"/>
+              <a:t>git</a:t>
+            </a:r>
+            <a:r>
+              <a:rPr lang="en-US" sz="4000" dirty="0"/>
+              <a:t> checkout –b &lt;branch-name&gt;</a:t>
+            </a:r>
+            <a:endParaRPr lang="es-ES" sz="4000" dirty="0"/>
+          </a:p>
+          <a:p>
+            <a:endParaRPr lang="es-ES" sz="4000" dirty="0"/>
+          </a:p>
+        </p:txBody>
+      </p:sp>
+    </p:spTree>
+    <p:extLst>
+      <p:ext uri="{BB962C8B-B14F-4D97-AF65-F5344CB8AC3E}">
+        <p14:creationId xmlns:p14="http://schemas.microsoft.com/office/powerpoint/2010/main" val="1536075843"/>
       </p:ext>
     </p:extLst>
   </p:cSld>

</xml_diff>